<commit_message>
merged all DDR slides into a single lesson
</commit_message>
<xml_diff>
--- a/Slides/Common Slides for CS 5010.pptx
+++ b/Slides/Common Slides for CS 5010.pptx
@@ -4874,7 +4874,7 @@
           <a:p>
             <a:fld id="{03B24962-D7B5-4FEA-ABE9-8C89DFE85AA1}" type="datetimeFigureOut">
               <a:rPr lang="en-US" smtClean="0"/>
-              <a:t>7/21/2017</a:t>
+              <a:t>7/24/2017</a:t>
             </a:fld>
             <a:endParaRPr lang="en-US"/>
           </a:p>
@@ -6540,7 +6540,7 @@
           <a:p>
             <a:fld id="{2F1F79F5-7BEC-496A-AFC7-876E38F64D71}" type="datetime1">
               <a:rPr lang="en-US" smtClean="0"/>
-              <a:t>7/21/2017</a:t>
+              <a:t>7/24/2017</a:t>
             </a:fld>
             <a:endParaRPr lang="en-US"/>
           </a:p>
@@ -6657,7 +6657,7 @@
           <a:p>
             <a:fld id="{2F7B77F5-1464-4F6B-92A8-64FC8A508293}" type="datetime1">
               <a:rPr lang="en-US" smtClean="0"/>
-              <a:t>7/21/2017</a:t>
+              <a:t>7/24/2017</a:t>
             </a:fld>
             <a:endParaRPr lang="en-US"/>
           </a:p>
@@ -6752,7 +6752,7 @@
           <a:p>
             <a:fld id="{0A05703A-7669-4FEA-9056-25299B4D29D4}" type="datetime1">
               <a:rPr lang="en-US" smtClean="0"/>
-              <a:t>7/21/2017</a:t>
+              <a:t>7/24/2017</a:t>
             </a:fld>
             <a:endParaRPr lang="en-US"/>
           </a:p>
@@ -7027,7 +7027,7 @@
           <a:p>
             <a:fld id="{6E5077B5-BB57-49DB-88CA-226A139E5C01}" type="datetime1">
               <a:rPr lang="en-US" smtClean="0"/>
-              <a:t>7/21/2017</a:t>
+              <a:t>7/24/2017</a:t>
             </a:fld>
             <a:endParaRPr lang="en-US"/>
           </a:p>
@@ -7279,7 +7279,7 @@
           <a:p>
             <a:fld id="{C48D9447-CBD6-49A1-89FD-8512A8CF8999}" type="datetime1">
               <a:rPr lang="en-US" smtClean="0"/>
-              <a:t>7/21/2017</a:t>
+              <a:t>7/24/2017</a:t>
             </a:fld>
             <a:endParaRPr lang="en-US"/>
           </a:p>
@@ -7447,7 +7447,7 @@
           <a:p>
             <a:fld id="{A3639A2A-823D-48B7-9ACE-7FAF42870BA9}" type="datetime1">
               <a:rPr lang="en-US" smtClean="0"/>
-              <a:t>7/21/2017</a:t>
+              <a:t>7/24/2017</a:t>
             </a:fld>
             <a:endParaRPr lang="en-US"/>
           </a:p>
@@ -7625,7 +7625,7 @@
           <a:p>
             <a:fld id="{ED1B6996-82E9-463C-972C-7B56056E426C}" type="datetime1">
               <a:rPr lang="en-US" smtClean="0"/>
-              <a:t>7/21/2017</a:t>
+              <a:t>7/24/2017</a:t>
             </a:fld>
             <a:endParaRPr lang="en-US"/>
           </a:p>
@@ -7799,7 +7799,7 @@
           <a:p>
             <a:fld id="{E22ED4DA-448D-4BB1-B935-CC112220207B}" type="datetime1">
               <a:rPr lang="en-US" smtClean="0"/>
-              <a:t>7/21/2017</a:t>
+              <a:t>7/24/2017</a:t>
             </a:fld>
             <a:endParaRPr lang="en-US"/>
           </a:p>
@@ -7972,7 +7972,7 @@
           <a:p>
             <a:fld id="{E22ED4DA-448D-4BB1-B935-CC112220207B}" type="datetime1">
               <a:rPr lang="en-US" smtClean="0"/>
-              <a:t>7/21/2017</a:t>
+              <a:t>7/24/2017</a:t>
             </a:fld>
             <a:endParaRPr lang="en-US"/>
           </a:p>
@@ -8235,7 +8235,7 @@
           <a:p>
             <a:fld id="{FF5D65A6-AB94-4435-B0B7-3743215FA46C}" type="datetime1">
               <a:rPr lang="en-US" smtClean="0"/>
-              <a:t>7/21/2017</a:t>
+              <a:t>7/24/2017</a:t>
             </a:fld>
             <a:endParaRPr lang="en-US"/>
           </a:p>
@@ -8411,7 +8411,7 @@
           <a:p>
             <a:fld id="{FF5D65A6-AB94-4435-B0B7-3743215FA46C}" type="datetime1">
               <a:rPr lang="en-US" smtClean="0"/>
-              <a:t>7/21/2017</a:t>
+              <a:t>7/24/2017</a:t>
             </a:fld>
             <a:endParaRPr lang="en-US"/>
           </a:p>
@@ -8705,7 +8705,7 @@
           <a:p>
             <a:fld id="{7C193DC4-6EF0-48C9-B29C-616106A645E1}" type="datetime1">
               <a:rPr lang="en-US" smtClean="0"/>
-              <a:t>7/21/2017</a:t>
+              <a:t>7/24/2017</a:t>
             </a:fld>
             <a:endParaRPr lang="en-US"/>
           </a:p>
@@ -8990,7 +8990,7 @@
           <a:p>
             <a:fld id="{5D1846AD-9252-4647-9435-4C2AC365653A}" type="datetime1">
               <a:rPr lang="en-US" smtClean="0"/>
-              <a:t>7/21/2017</a:t>
+              <a:t>7/24/2017</a:t>
             </a:fld>
             <a:endParaRPr lang="en-US"/>
           </a:p>
@@ -9289,7 +9289,7 @@
           <a:p>
             <a:fld id="{5D1846AD-9252-4647-9435-4C2AC365653A}" type="datetime1">
               <a:rPr lang="en-US" smtClean="0"/>
-              <a:t>7/21/2017</a:t>
+              <a:t>7/24/2017</a:t>
             </a:fld>
             <a:endParaRPr lang="en-US"/>
           </a:p>
@@ -9708,7 +9708,7 @@
           <a:p>
             <a:fld id="{CE56DC10-3561-4063-A6AF-C1CC7A41040A}" type="datetime1">
               <a:rPr lang="en-US" smtClean="0"/>
-              <a:t>7/21/2017</a:t>
+              <a:t>7/24/2017</a:t>
             </a:fld>
             <a:endParaRPr lang="en-US"/>
           </a:p>
@@ -9931,7 +9931,7 @@
           <a:p>
             <a:fld id="{02B3F677-983B-48DB-ADFD-63FE6CBC7FB2}" type="datetime1">
               <a:rPr lang="en-US" smtClean="0"/>
-              <a:t>7/21/2017</a:t>
+              <a:t>7/24/2017</a:t>
             </a:fld>
             <a:endParaRPr lang="en-US"/>
           </a:p>

</xml_diff>